<commit_message>
Edit build tools and add some examples
</commit_message>
<xml_diff>
--- a/x.x-build-tools/Инструменты сборки.pptx
+++ b/x.x-build-tools/Инструменты сборки.pptx
@@ -18,23 +18,25 @@
     <p:sldId id="263" r:id="rId14"/>
     <p:sldId id="264" r:id="rId15"/>
     <p:sldId id="265" r:id="rId16"/>
+    <p:sldId id="266" r:id="rId17"/>
+    <p:sldId id="267" r:id="rId18"/>
   </p:sldIdLst>
   <p:sldSz cy="5143500" cx="9144000"/>
   <p:notesSz cx="6858000" cy="9144000"/>
   <p:embeddedFontLst>
     <p:embeddedFont>
       <p:font typeface="Raleway"/>
-      <p:regular r:id="rId17"/>
-      <p:bold r:id="rId18"/>
-      <p:italic r:id="rId19"/>
-      <p:boldItalic r:id="rId20"/>
+      <p:regular r:id="rId19"/>
+      <p:bold r:id="rId20"/>
+      <p:italic r:id="rId21"/>
+      <p:boldItalic r:id="rId22"/>
     </p:embeddedFont>
     <p:embeddedFont>
       <p:font typeface="Lato"/>
-      <p:regular r:id="rId21"/>
-      <p:bold r:id="rId22"/>
-      <p:italic r:id="rId23"/>
-      <p:boldItalic r:id="rId24"/>
+      <p:regular r:id="rId23"/>
+      <p:bold r:id="rId24"/>
+      <p:italic r:id="rId25"/>
+      <p:boldItalic r:id="rId26"/>
     </p:embeddedFont>
   </p:embeddedFontLst>
   <p:defaultTextStyle>
@@ -865,6 +867,204 @@
       <p:sp>
         <p:nvSpPr>
           <p:cNvPr id="167" name="Google Shape;167;g9aebc4d095_0_181:notes"/>
+          <p:cNvSpPr txBox="1"/>
+          <p:nvPr>
+            <p:ph idx="1" type="body"/>
+          </p:nvPr>
+        </p:nvSpPr>
+        <p:spPr>
+          <a:xfrm>
+            <a:off x="685800" y="4343400"/>
+            <a:ext cx="5486400" cy="4114800"/>
+          </a:xfrm>
+          <a:prstGeom prst="rect">
+            <a:avLst/>
+          </a:prstGeom>
+        </p:spPr>
+        <p:txBody>
+          <a:bodyPr anchorCtr="0" anchor="t" bIns="91425" lIns="91425" spcFirstLastPara="1" rIns="91425" wrap="square" tIns="91425">
+            <a:noAutofit/>
+          </a:bodyPr>
+          <a:lstStyle/>
+          <a:p>
+            <a:pPr indent="0" lvl="0" marL="0" rtl="0" algn="l">
+              <a:spcBef>
+                <a:spcPts val="0"/>
+              </a:spcBef>
+              <a:spcAft>
+                <a:spcPts val="0"/>
+              </a:spcAft>
+              <a:buNone/>
+            </a:pPr>
+            <a:r>
+              <a:t/>
+            </a:r>
+            <a:endParaRPr/>
+          </a:p>
+        </p:txBody>
+      </p:sp>
+    </p:spTree>
+  </p:cSld>
+  <p:clrMapOvr>
+    <a:masterClrMapping/>
+  </p:clrMapOvr>
+</p:notes>
+</file>
+
+<file path=ppt/notesSlides/notesSlide11.xml><?xml version="1.0" encoding="utf-8"?>
+<p:notes xmlns:a="http://schemas.openxmlformats.org/drawingml/2006/main" xmlns:r="http://schemas.openxmlformats.org/officeDocument/2006/relationships" xmlns:mc="http://schemas.openxmlformats.org/markup-compatibility/2006" xmlns:mv="urn:schemas-microsoft-com:mac:vml" xmlns:p="http://schemas.openxmlformats.org/presentationml/2006/main" xmlns:c="http://schemas.openxmlformats.org/drawingml/2006/chart" xmlns:dgm="http://schemas.openxmlformats.org/drawingml/2006/diagram" xmlns:o="urn:schemas-microsoft-com:office:office" xmlns:v="urn:schemas-microsoft-com:vml" xmlns:pvml="urn:schemas-microsoft-com:office:powerpoint" xmlns:com="http://schemas.openxmlformats.org/drawingml/2006/compatibility" xmlns:p14="http://schemas.microsoft.com/office/powerpoint/2010/main" xmlns:p15="http://schemas.microsoft.com/office/powerpoint/2012/main" xmlns:ahyp="http://schemas.microsoft.com/office/drawing/2018/hyperlinkcolor" showMasterPhAnim="0" showMasterSp="0">
+  <p:cSld>
+    <p:spTree>
+      <p:nvGrpSpPr>
+        <p:cNvPr id="171" name="Shape 171"/>
+        <p:cNvGrpSpPr/>
+        <p:nvPr/>
+      </p:nvGrpSpPr>
+      <p:grpSpPr>
+        <a:xfrm>
+          <a:off x="0" y="0"/>
+          <a:ext cx="0" cy="0"/>
+          <a:chOff x="0" y="0"/>
+          <a:chExt cx="0" cy="0"/>
+        </a:xfrm>
+      </p:grpSpPr>
+      <p:sp>
+        <p:nvSpPr>
+          <p:cNvPr id="172" name="Google Shape;172;g99cc4b5be5_0_0:notes"/>
+          <p:cNvSpPr/>
+          <p:nvPr>
+            <p:ph idx="2" type="sldImg"/>
+          </p:nvPr>
+        </p:nvSpPr>
+        <p:spPr>
+          <a:xfrm>
+            <a:off x="381300" y="685800"/>
+            <a:ext cx="6096000" cy="3429000"/>
+          </a:xfrm>
+          <a:custGeom>
+            <a:rect b="b" l="l" r="r" t="t"/>
+            <a:pathLst>
+              <a:path extrusionOk="0" h="120000" w="120000">
+                <a:moveTo>
+                  <a:pt x="0" y="0"/>
+                </a:moveTo>
+                <a:lnTo>
+                  <a:pt x="120000" y="0"/>
+                </a:lnTo>
+                <a:lnTo>
+                  <a:pt x="120000" y="120000"/>
+                </a:lnTo>
+                <a:lnTo>
+                  <a:pt x="0" y="120000"/>
+                </a:lnTo>
+                <a:close/>
+              </a:path>
+            </a:pathLst>
+          </a:custGeom>
+        </p:spPr>
+      </p:sp>
+      <p:sp>
+        <p:nvSpPr>
+          <p:cNvPr id="173" name="Google Shape;173;g99cc4b5be5_0_0:notes"/>
+          <p:cNvSpPr txBox="1"/>
+          <p:nvPr>
+            <p:ph idx="1" type="body"/>
+          </p:nvPr>
+        </p:nvSpPr>
+        <p:spPr>
+          <a:xfrm>
+            <a:off x="685800" y="4343400"/>
+            <a:ext cx="5486400" cy="4114800"/>
+          </a:xfrm>
+          <a:prstGeom prst="rect">
+            <a:avLst/>
+          </a:prstGeom>
+        </p:spPr>
+        <p:txBody>
+          <a:bodyPr anchorCtr="0" anchor="t" bIns="91425" lIns="91425" spcFirstLastPara="1" rIns="91425" wrap="square" tIns="91425">
+            <a:noAutofit/>
+          </a:bodyPr>
+          <a:lstStyle/>
+          <a:p>
+            <a:pPr indent="0" lvl="0" marL="0" rtl="0" algn="l">
+              <a:spcBef>
+                <a:spcPts val="0"/>
+              </a:spcBef>
+              <a:spcAft>
+                <a:spcPts val="0"/>
+              </a:spcAft>
+              <a:buNone/>
+            </a:pPr>
+            <a:r>
+              <a:t/>
+            </a:r>
+            <a:endParaRPr/>
+          </a:p>
+        </p:txBody>
+      </p:sp>
+    </p:spTree>
+  </p:cSld>
+  <p:clrMapOvr>
+    <a:masterClrMapping/>
+  </p:clrMapOvr>
+</p:notes>
+</file>
+
+<file path=ppt/notesSlides/notesSlide12.xml><?xml version="1.0" encoding="utf-8"?>
+<p:notes xmlns:a="http://schemas.openxmlformats.org/drawingml/2006/main" xmlns:r="http://schemas.openxmlformats.org/officeDocument/2006/relationships" xmlns:mc="http://schemas.openxmlformats.org/markup-compatibility/2006" xmlns:mv="urn:schemas-microsoft-com:mac:vml" xmlns:p="http://schemas.openxmlformats.org/presentationml/2006/main" xmlns:c="http://schemas.openxmlformats.org/drawingml/2006/chart" xmlns:dgm="http://schemas.openxmlformats.org/drawingml/2006/diagram" xmlns:o="urn:schemas-microsoft-com:office:office" xmlns:v="urn:schemas-microsoft-com:vml" xmlns:pvml="urn:schemas-microsoft-com:office:powerpoint" xmlns:com="http://schemas.openxmlformats.org/drawingml/2006/compatibility" xmlns:p14="http://schemas.microsoft.com/office/powerpoint/2010/main" xmlns:p15="http://schemas.microsoft.com/office/powerpoint/2012/main" xmlns:ahyp="http://schemas.microsoft.com/office/drawing/2018/hyperlinkcolor" showMasterPhAnim="0" showMasterSp="0">
+  <p:cSld>
+    <p:spTree>
+      <p:nvGrpSpPr>
+        <p:cNvPr id="179" name="Shape 179"/>
+        <p:cNvGrpSpPr/>
+        <p:nvPr/>
+      </p:nvGrpSpPr>
+      <p:grpSpPr>
+        <a:xfrm>
+          <a:off x="0" y="0"/>
+          <a:ext cx="0" cy="0"/>
+          <a:chOff x="0" y="0"/>
+          <a:chExt cx="0" cy="0"/>
+        </a:xfrm>
+      </p:grpSpPr>
+      <p:sp>
+        <p:nvSpPr>
+          <p:cNvPr id="180" name="Google Shape;180;g99cc4b5be5_0_12:notes"/>
+          <p:cNvSpPr/>
+          <p:nvPr>
+            <p:ph idx="2" type="sldImg"/>
+          </p:nvPr>
+        </p:nvSpPr>
+        <p:spPr>
+          <a:xfrm>
+            <a:off x="381300" y="685800"/>
+            <a:ext cx="6096000" cy="3429000"/>
+          </a:xfrm>
+          <a:custGeom>
+            <a:rect b="b" l="l" r="r" t="t"/>
+            <a:pathLst>
+              <a:path extrusionOk="0" h="120000" w="120000">
+                <a:moveTo>
+                  <a:pt x="0" y="0"/>
+                </a:moveTo>
+                <a:lnTo>
+                  <a:pt x="120000" y="0"/>
+                </a:lnTo>
+                <a:lnTo>
+                  <a:pt x="120000" y="120000"/>
+                </a:lnTo>
+                <a:lnTo>
+                  <a:pt x="0" y="120000"/>
+                </a:lnTo>
+                <a:close/>
+              </a:path>
+            </a:pathLst>
+          </a:custGeom>
+        </p:spPr>
+      </p:sp>
+      <p:sp>
+        <p:nvSpPr>
+          <p:cNvPr id="181" name="Google Shape;181;g99cc4b5be5_0_12:notes"/>
           <p:cNvSpPr txBox="1"/>
           <p:nvPr>
             <p:ph idx="1" type="body"/>
@@ -8485,7 +8685,7 @@
         <p:spPr>
           <a:xfrm>
             <a:off x="829925" y="2078875"/>
-            <a:ext cx="8254800" cy="2261100"/>
+            <a:ext cx="8254800" cy="1147200"/>
           </a:xfrm>
           <a:prstGeom prst="rect">
             <a:avLst/>
@@ -8501,6 +8701,9 @@
           <a:lstStyle/>
           <a:p>
             <a:pPr indent="0" lvl="0" marL="0" rtl="0" algn="l">
+              <a:lnSpc>
+                <a:spcPct val="115000"/>
+              </a:lnSpc>
               <a:spcBef>
                 <a:spcPts val="0"/>
               </a:spcBef>
@@ -8539,8 +8742,11 @@
           </a:p>
           <a:p>
             <a:pPr indent="0" lvl="0" marL="0" rtl="0" algn="l">
-              <a:spcBef>
-                <a:spcPts val="1600"/>
+              <a:lnSpc>
+                <a:spcPct val="115000"/>
+              </a:lnSpc>
+              <a:spcBef>
+                <a:spcPts val="0"/>
               </a:spcBef>
               <a:spcAft>
                 <a:spcPts val="0"/>
@@ -8652,8 +8858,11 @@
           </a:p>
           <a:p>
             <a:pPr indent="0" lvl="0" marL="0" rtl="0" algn="l">
-              <a:spcBef>
-                <a:spcPts val="1600"/>
+              <a:lnSpc>
+                <a:spcPct val="115000"/>
+              </a:lnSpc>
+              <a:spcBef>
+                <a:spcPts val="0"/>
               </a:spcBef>
               <a:spcAft>
                 <a:spcPts val="0"/>
@@ -8705,8 +8914,11 @@
           </a:p>
           <a:p>
             <a:pPr indent="0" lvl="0" marL="0" rtl="0" algn="l">
-              <a:spcBef>
-                <a:spcPts val="1600"/>
+              <a:lnSpc>
+                <a:spcPct val="115000"/>
+              </a:lnSpc>
+              <a:spcBef>
+                <a:spcPts val="0"/>
               </a:spcBef>
               <a:spcAft>
                 <a:spcPts val="0"/>
@@ -8819,10 +9031,10 @@
           <a:p>
             <a:pPr indent="0" lvl="0" marL="152400" marR="152400" rtl="0" algn="l">
               <a:lnSpc>
-                <a:spcPct val="145000"/>
+                <a:spcPct val="115000"/>
               </a:lnSpc>
               <a:spcBef>
-                <a:spcPts val="1600"/>
+                <a:spcPts val="0"/>
               </a:spcBef>
               <a:spcAft>
                 <a:spcPts val="0"/>
@@ -8860,7 +9072,1220 @@
           <a:p>
             <a:pPr indent="0" lvl="0" marL="0" rtl="0" algn="l">
               <a:spcBef>
+                <a:spcPts val="0"/>
+              </a:spcBef>
+              <a:spcAft>
+                <a:spcPts val="1600"/>
+              </a:spcAft>
+              <a:buNone/>
+            </a:pPr>
+            <a:r>
+              <a:t/>
+            </a:r>
+            <a:endParaRPr/>
+          </a:p>
+        </p:txBody>
+      </p:sp>
+    </p:spTree>
+  </p:cSld>
+  <p:clrMapOvr>
+    <a:masterClrMapping/>
+  </p:clrMapOvr>
+</p:sld>
+</file>
+
+<file path=ppt/slides/slide11.xml><?xml version="1.0" encoding="utf-8"?>
+<p:sld xmlns:a="http://schemas.openxmlformats.org/drawingml/2006/main" xmlns:r="http://schemas.openxmlformats.org/officeDocument/2006/relationships" xmlns:mc="http://schemas.openxmlformats.org/markup-compatibility/2006" xmlns:mv="urn:schemas-microsoft-com:mac:vml" xmlns:p="http://schemas.openxmlformats.org/presentationml/2006/main" xmlns:c="http://schemas.openxmlformats.org/drawingml/2006/chart" xmlns:dgm="http://schemas.openxmlformats.org/drawingml/2006/diagram" xmlns:o="urn:schemas-microsoft-com:office:office" xmlns:v="urn:schemas-microsoft-com:vml" xmlns:pvml="urn:schemas-microsoft-com:office:powerpoint" xmlns:com="http://schemas.openxmlformats.org/drawingml/2006/compatibility" xmlns:p14="http://schemas.microsoft.com/office/powerpoint/2010/main" xmlns:p15="http://schemas.microsoft.com/office/powerpoint/2012/main" xmlns:ahyp="http://schemas.microsoft.com/office/drawing/2018/hyperlinkcolor">
+  <p:cSld>
+    <p:spTree>
+      <p:nvGrpSpPr>
+        <p:cNvPr id="174" name="Shape 174"/>
+        <p:cNvGrpSpPr/>
+        <p:nvPr/>
+      </p:nvGrpSpPr>
+      <p:grpSpPr>
+        <a:xfrm>
+          <a:off x="0" y="0"/>
+          <a:ext cx="0" cy="0"/>
+          <a:chOff x="0" y="0"/>
+          <a:chExt cx="0" cy="0"/>
+        </a:xfrm>
+      </p:grpSpPr>
+      <p:sp>
+        <p:nvSpPr>
+          <p:cNvPr id="175" name="Google Shape;175;p23"/>
+          <p:cNvSpPr txBox="1"/>
+          <p:nvPr>
+            <p:ph type="title"/>
+          </p:nvPr>
+        </p:nvSpPr>
+        <p:spPr>
+          <a:xfrm>
+            <a:off x="729450" y="1318650"/>
+            <a:ext cx="7688700" cy="535200"/>
+          </a:xfrm>
+          <a:prstGeom prst="rect">
+            <a:avLst/>
+          </a:prstGeom>
+        </p:spPr>
+        <p:txBody>
+          <a:bodyPr anchorCtr="0" anchor="t" bIns="91425" lIns="91425" spcFirstLastPara="1" rIns="91425" wrap="square" tIns="91425">
+            <a:noAutofit/>
+          </a:bodyPr>
+          <a:lstStyle/>
+          <a:p>
+            <a:pPr indent="0" lvl="0" marL="0" rtl="0" algn="l">
+              <a:spcBef>
+                <a:spcPts val="0"/>
+              </a:spcBef>
+              <a:spcAft>
+                <a:spcPts val="0"/>
+              </a:spcAft>
+              <a:buNone/>
+            </a:pPr>
+            <a:r>
+              <a:rPr lang="ru"/>
+              <a:t>Профили</a:t>
+            </a:r>
+            <a:endParaRPr/>
+          </a:p>
+        </p:txBody>
+      </p:sp>
+      <p:sp>
+        <p:nvSpPr>
+          <p:cNvPr id="176" name="Google Shape;176;p23"/>
+          <p:cNvSpPr txBox="1"/>
+          <p:nvPr>
+            <p:ph idx="1" type="body"/>
+          </p:nvPr>
+        </p:nvSpPr>
+        <p:spPr>
+          <a:xfrm>
+            <a:off x="729450" y="3800375"/>
+            <a:ext cx="7688700" cy="846300"/>
+          </a:xfrm>
+          <a:prstGeom prst="rect">
+            <a:avLst/>
+          </a:prstGeom>
+        </p:spPr>
+        <p:txBody>
+          <a:bodyPr anchorCtr="0" anchor="t" bIns="91425" lIns="91425" spcFirstLastPara="1" rIns="91425" wrap="square" tIns="91425">
+            <a:noAutofit/>
+          </a:bodyPr>
+          <a:lstStyle/>
+          <a:p>
+            <a:pPr indent="0" lvl="0" marL="0" rtl="0" algn="l">
+              <a:spcBef>
+                <a:spcPts val="0"/>
+              </a:spcBef>
+              <a:spcAft>
+                <a:spcPts val="0"/>
+              </a:spcAft>
+              <a:buNone/>
+            </a:pPr>
+            <a:r>
+              <a:rPr lang="ru"/>
+              <a:t>А потом применять их через системные переменные:</a:t>
+            </a:r>
+            <a:endParaRPr/>
+          </a:p>
+          <a:p>
+            <a:pPr indent="0" lvl="0" marL="0" marR="152400" rtl="0" algn="l">
+              <a:lnSpc>
+                <a:spcPct val="145000"/>
+              </a:lnSpc>
+              <a:spcBef>
+                <a:spcPts val="1600"/>
+              </a:spcBef>
+              <a:spcAft>
+                <a:spcPts val="0"/>
+              </a:spcAft>
+              <a:buNone/>
+            </a:pPr>
+            <a:r>
+              <a:rPr lang="ru" sz="1100">
+                <a:solidFill>
+                  <a:srgbClr val="333333"/>
+                </a:solidFill>
+                <a:highlight>
+                  <a:srgbClr val="F7F7F7"/>
+                </a:highlight>
+                <a:latin typeface="Courier New"/>
+                <a:ea typeface="Courier New"/>
+                <a:cs typeface="Courier New"/>
+                <a:sym typeface="Courier New"/>
+              </a:rPr>
+              <a:t>gradlew -Penv=prod build</a:t>
+            </a:r>
+            <a:endParaRPr sz="1100">
+              <a:solidFill>
+                <a:srgbClr val="333333"/>
+              </a:solidFill>
+              <a:highlight>
+                <a:srgbClr val="F7F7F7"/>
+              </a:highlight>
+              <a:latin typeface="Courier New"/>
+              <a:ea typeface="Courier New"/>
+              <a:cs typeface="Courier New"/>
+              <a:sym typeface="Courier New"/>
+            </a:endParaRPr>
+          </a:p>
+          <a:p>
+            <a:pPr indent="0" lvl="0" marL="0" rtl="0" algn="l">
+              <a:spcBef>
                 <a:spcPts val="1200"/>
+              </a:spcBef>
+              <a:spcAft>
+                <a:spcPts val="0"/>
+              </a:spcAft>
+              <a:buNone/>
+            </a:pPr>
+            <a:r>
+              <a:t/>
+            </a:r>
+            <a:endParaRPr/>
+          </a:p>
+          <a:p>
+            <a:pPr indent="0" lvl="0" marL="152400" marR="152400" rtl="0" algn="l">
+              <a:lnSpc>
+                <a:spcPct val="100000"/>
+              </a:lnSpc>
+              <a:spcBef>
+                <a:spcPts val="1600"/>
+              </a:spcBef>
+              <a:spcAft>
+                <a:spcPts val="0"/>
+              </a:spcAft>
+              <a:buNone/>
+            </a:pPr>
+            <a:r>
+              <a:t/>
+            </a:r>
+            <a:endParaRPr sz="1000">
+              <a:solidFill>
+                <a:srgbClr val="333333"/>
+              </a:solidFill>
+              <a:highlight>
+                <a:srgbClr val="F7F7F7"/>
+              </a:highlight>
+              <a:latin typeface="Courier New"/>
+              <a:ea typeface="Courier New"/>
+              <a:cs typeface="Courier New"/>
+              <a:sym typeface="Courier New"/>
+            </a:endParaRPr>
+          </a:p>
+          <a:p>
+            <a:pPr indent="0" lvl="0" marL="0" rtl="0" algn="l">
+              <a:spcBef>
+                <a:spcPts val="1200"/>
+              </a:spcBef>
+              <a:spcAft>
+                <a:spcPts val="0"/>
+              </a:spcAft>
+              <a:buNone/>
+            </a:pPr>
+            <a:r>
+              <a:t/>
+            </a:r>
+            <a:endParaRPr i="1" sz="1000">
+              <a:solidFill>
+                <a:srgbClr val="8C8C8C"/>
+              </a:solidFill>
+              <a:highlight>
+                <a:srgbClr val="FFFFFF"/>
+              </a:highlight>
+              <a:latin typeface="Courier New"/>
+              <a:ea typeface="Courier New"/>
+              <a:cs typeface="Courier New"/>
+              <a:sym typeface="Courier New"/>
+            </a:endParaRPr>
+          </a:p>
+          <a:p>
+            <a:pPr indent="0" lvl="0" marL="0" rtl="0" algn="l">
+              <a:spcBef>
+                <a:spcPts val="1600"/>
+              </a:spcBef>
+              <a:spcAft>
+                <a:spcPts val="1600"/>
+              </a:spcAft>
+              <a:buNone/>
+            </a:pPr>
+            <a:r>
+              <a:t/>
+            </a:r>
+            <a:endParaRPr/>
+          </a:p>
+        </p:txBody>
+      </p:sp>
+      <p:sp>
+        <p:nvSpPr>
+          <p:cNvPr id="177" name="Google Shape;177;p23"/>
+          <p:cNvSpPr txBox="1"/>
+          <p:nvPr/>
+        </p:nvSpPr>
+        <p:spPr>
+          <a:xfrm>
+            <a:off x="729450" y="2571750"/>
+            <a:ext cx="6102300" cy="1067100"/>
+          </a:xfrm>
+          <a:prstGeom prst="rect">
+            <a:avLst/>
+          </a:prstGeom>
+          <a:solidFill>
+            <a:srgbClr val="F3F3F3"/>
+          </a:solidFill>
+          <a:ln>
+            <a:noFill/>
+          </a:ln>
+        </p:spPr>
+        <p:txBody>
+          <a:bodyPr anchorCtr="0" anchor="t" bIns="91425" lIns="91425" spcFirstLastPara="1" rIns="91425" wrap="square" tIns="91425">
+            <a:noAutofit/>
+          </a:bodyPr>
+          <a:lstStyle/>
+          <a:p>
+            <a:pPr indent="0" lvl="0" marL="0" rtl="0" algn="l">
+              <a:spcBef>
+                <a:spcPts val="0"/>
+              </a:spcBef>
+              <a:spcAft>
+                <a:spcPts val="0"/>
+              </a:spcAft>
+              <a:buNone/>
+            </a:pPr>
+            <a:r>
+              <a:rPr lang="ru" sz="1000">
+                <a:solidFill>
+                  <a:srgbClr val="000043"/>
+                </a:solidFill>
+                <a:highlight>
+                  <a:srgbClr val="F7F7F7"/>
+                </a:highlight>
+                <a:latin typeface="Courier New"/>
+                <a:ea typeface="Courier New"/>
+                <a:cs typeface="Courier New"/>
+                <a:sym typeface="Courier New"/>
+              </a:rPr>
+              <a:t>if</a:t>
+            </a:r>
+            <a:r>
+              <a:rPr lang="ru" sz="1000">
+                <a:solidFill>
+                  <a:srgbClr val="333333"/>
+                </a:solidFill>
+                <a:highlight>
+                  <a:srgbClr val="F7F7F7"/>
+                </a:highlight>
+                <a:latin typeface="Courier New"/>
+                <a:ea typeface="Courier New"/>
+                <a:cs typeface="Courier New"/>
+                <a:sym typeface="Courier New"/>
+              </a:rPr>
+              <a:t> (project.hasProperty(</a:t>
+            </a:r>
+            <a:r>
+              <a:rPr lang="ru" sz="1000">
+                <a:solidFill>
+                  <a:srgbClr val="008000"/>
+                </a:solidFill>
+                <a:highlight>
+                  <a:srgbClr val="F7F7F7"/>
+                </a:highlight>
+                <a:latin typeface="Courier New"/>
+                <a:ea typeface="Courier New"/>
+                <a:cs typeface="Courier New"/>
+                <a:sym typeface="Courier New"/>
+              </a:rPr>
+              <a:t>'env'</a:t>
+            </a:r>
+            <a:r>
+              <a:rPr lang="ru" sz="1000">
+                <a:solidFill>
+                  <a:srgbClr val="333333"/>
+                </a:solidFill>
+                <a:highlight>
+                  <a:srgbClr val="F7F7F7"/>
+                </a:highlight>
+                <a:latin typeface="Courier New"/>
+                <a:ea typeface="Courier New"/>
+                <a:cs typeface="Courier New"/>
+                <a:sym typeface="Courier New"/>
+              </a:rPr>
+              <a:t>) &amp;&amp; project.getProperty(</a:t>
+            </a:r>
+            <a:r>
+              <a:rPr lang="ru" sz="1000">
+                <a:solidFill>
+                  <a:srgbClr val="008000"/>
+                </a:solidFill>
+                <a:highlight>
+                  <a:srgbClr val="F7F7F7"/>
+                </a:highlight>
+                <a:latin typeface="Courier New"/>
+                <a:ea typeface="Courier New"/>
+                <a:cs typeface="Courier New"/>
+                <a:sym typeface="Courier New"/>
+              </a:rPr>
+              <a:t>'env'</a:t>
+            </a:r>
+            <a:r>
+              <a:rPr lang="ru" sz="1000">
+                <a:solidFill>
+                  <a:srgbClr val="333333"/>
+                </a:solidFill>
+                <a:highlight>
+                  <a:srgbClr val="F7F7F7"/>
+                </a:highlight>
+                <a:latin typeface="Courier New"/>
+                <a:ea typeface="Courier New"/>
+                <a:cs typeface="Courier New"/>
+                <a:sym typeface="Courier New"/>
+              </a:rPr>
+              <a:t>) == </a:t>
+            </a:r>
+            <a:r>
+              <a:rPr lang="ru" sz="1000">
+                <a:solidFill>
+                  <a:srgbClr val="008000"/>
+                </a:solidFill>
+                <a:highlight>
+                  <a:srgbClr val="F7F7F7"/>
+                </a:highlight>
+                <a:latin typeface="Courier New"/>
+                <a:ea typeface="Courier New"/>
+                <a:cs typeface="Courier New"/>
+                <a:sym typeface="Courier New"/>
+              </a:rPr>
+              <a:t>'prod'</a:t>
+            </a:r>
+            <a:r>
+              <a:rPr lang="ru" sz="1000">
+                <a:solidFill>
+                  <a:srgbClr val="333333"/>
+                </a:solidFill>
+                <a:highlight>
+                  <a:srgbClr val="F7F7F7"/>
+                </a:highlight>
+                <a:latin typeface="Courier New"/>
+                <a:ea typeface="Courier New"/>
+                <a:cs typeface="Courier New"/>
+                <a:sym typeface="Courier New"/>
+              </a:rPr>
+              <a:t>) {</a:t>
+            </a:r>
+            <a:endParaRPr sz="1000">
+              <a:solidFill>
+                <a:srgbClr val="333333"/>
+              </a:solidFill>
+              <a:highlight>
+                <a:srgbClr val="F7F7F7"/>
+              </a:highlight>
+              <a:latin typeface="Courier New"/>
+              <a:ea typeface="Courier New"/>
+              <a:cs typeface="Courier New"/>
+              <a:sym typeface="Courier New"/>
+            </a:endParaRPr>
+          </a:p>
+          <a:p>
+            <a:pPr indent="0" lvl="0" marL="0" rtl="0" algn="l">
+              <a:spcBef>
+                <a:spcPts val="0"/>
+              </a:spcBef>
+              <a:spcAft>
+                <a:spcPts val="0"/>
+              </a:spcAft>
+              <a:buNone/>
+            </a:pPr>
+            <a:r>
+              <a:rPr lang="ru" sz="1000">
+                <a:solidFill>
+                  <a:srgbClr val="333333"/>
+                </a:solidFill>
+                <a:highlight>
+                  <a:srgbClr val="F7F7F7"/>
+                </a:highlight>
+                <a:latin typeface="Courier New"/>
+                <a:ea typeface="Courier New"/>
+                <a:cs typeface="Courier New"/>
+                <a:sym typeface="Courier New"/>
+              </a:rPr>
+              <a:t>    apply from: </a:t>
+            </a:r>
+            <a:r>
+              <a:rPr lang="ru" sz="1000">
+                <a:solidFill>
+                  <a:srgbClr val="008000"/>
+                </a:solidFill>
+                <a:highlight>
+                  <a:srgbClr val="F7F7F7"/>
+                </a:highlight>
+                <a:latin typeface="Courier New"/>
+                <a:ea typeface="Courier New"/>
+                <a:cs typeface="Courier New"/>
+                <a:sym typeface="Courier New"/>
+              </a:rPr>
+              <a:t>'gradle/production.gradle'</a:t>
+            </a:r>
+            <a:endParaRPr sz="1000">
+              <a:solidFill>
+                <a:srgbClr val="333333"/>
+              </a:solidFill>
+              <a:highlight>
+                <a:srgbClr val="F7F7F7"/>
+              </a:highlight>
+              <a:latin typeface="Courier New"/>
+              <a:ea typeface="Courier New"/>
+              <a:cs typeface="Courier New"/>
+              <a:sym typeface="Courier New"/>
+            </a:endParaRPr>
+          </a:p>
+          <a:p>
+            <a:pPr indent="0" lvl="0" marL="0" rtl="0" algn="l">
+              <a:spcBef>
+                <a:spcPts val="0"/>
+              </a:spcBef>
+              <a:spcAft>
+                <a:spcPts val="0"/>
+              </a:spcAft>
+              <a:buNone/>
+            </a:pPr>
+            <a:r>
+              <a:rPr lang="ru" sz="1000">
+                <a:solidFill>
+                  <a:srgbClr val="333333"/>
+                </a:solidFill>
+                <a:highlight>
+                  <a:srgbClr val="F7F7F7"/>
+                </a:highlight>
+                <a:latin typeface="Courier New"/>
+                <a:ea typeface="Courier New"/>
+                <a:cs typeface="Courier New"/>
+                <a:sym typeface="Courier New"/>
+              </a:rPr>
+              <a:t>} </a:t>
+            </a:r>
+            <a:r>
+              <a:rPr lang="ru" sz="1000">
+                <a:solidFill>
+                  <a:srgbClr val="000043"/>
+                </a:solidFill>
+                <a:highlight>
+                  <a:srgbClr val="F7F7F7"/>
+                </a:highlight>
+                <a:latin typeface="Courier New"/>
+                <a:ea typeface="Courier New"/>
+                <a:cs typeface="Courier New"/>
+                <a:sym typeface="Courier New"/>
+              </a:rPr>
+              <a:t>else</a:t>
+            </a:r>
+            <a:r>
+              <a:rPr lang="ru" sz="1000">
+                <a:solidFill>
+                  <a:srgbClr val="333333"/>
+                </a:solidFill>
+                <a:highlight>
+                  <a:srgbClr val="F7F7F7"/>
+                </a:highlight>
+                <a:latin typeface="Courier New"/>
+                <a:ea typeface="Courier New"/>
+                <a:cs typeface="Courier New"/>
+                <a:sym typeface="Courier New"/>
+              </a:rPr>
+              <a:t> {</a:t>
+            </a:r>
+            <a:endParaRPr sz="1000">
+              <a:solidFill>
+                <a:srgbClr val="333333"/>
+              </a:solidFill>
+              <a:highlight>
+                <a:srgbClr val="F7F7F7"/>
+              </a:highlight>
+              <a:latin typeface="Courier New"/>
+              <a:ea typeface="Courier New"/>
+              <a:cs typeface="Courier New"/>
+              <a:sym typeface="Courier New"/>
+            </a:endParaRPr>
+          </a:p>
+          <a:p>
+            <a:pPr indent="0" lvl="0" marL="0" rtl="0" algn="l">
+              <a:spcBef>
+                <a:spcPts val="0"/>
+              </a:spcBef>
+              <a:spcAft>
+                <a:spcPts val="0"/>
+              </a:spcAft>
+              <a:buNone/>
+            </a:pPr>
+            <a:r>
+              <a:rPr lang="ru" sz="1000">
+                <a:solidFill>
+                  <a:srgbClr val="333333"/>
+                </a:solidFill>
+                <a:highlight>
+                  <a:srgbClr val="F7F7F7"/>
+                </a:highlight>
+                <a:latin typeface="Courier New"/>
+                <a:ea typeface="Courier New"/>
+                <a:cs typeface="Courier New"/>
+                <a:sym typeface="Courier New"/>
+              </a:rPr>
+              <a:t>    apply from: </a:t>
+            </a:r>
+            <a:r>
+              <a:rPr lang="ru" sz="1000">
+                <a:solidFill>
+                  <a:srgbClr val="008000"/>
+                </a:solidFill>
+                <a:highlight>
+                  <a:srgbClr val="F7F7F7"/>
+                </a:highlight>
+                <a:latin typeface="Courier New"/>
+                <a:ea typeface="Courier New"/>
+                <a:cs typeface="Courier New"/>
+                <a:sym typeface="Courier New"/>
+              </a:rPr>
+              <a:t>'gradle/development.gradle'</a:t>
+            </a:r>
+            <a:endParaRPr sz="1000">
+              <a:solidFill>
+                <a:srgbClr val="333333"/>
+              </a:solidFill>
+              <a:highlight>
+                <a:srgbClr val="F7F7F7"/>
+              </a:highlight>
+              <a:latin typeface="Courier New"/>
+              <a:ea typeface="Courier New"/>
+              <a:cs typeface="Courier New"/>
+              <a:sym typeface="Courier New"/>
+            </a:endParaRPr>
+          </a:p>
+          <a:p>
+            <a:pPr indent="0" lvl="0" marL="0" marR="152400" rtl="0" algn="l">
+              <a:spcBef>
+                <a:spcPts val="0"/>
+              </a:spcBef>
+              <a:spcAft>
+                <a:spcPts val="0"/>
+              </a:spcAft>
+              <a:buNone/>
+            </a:pPr>
+            <a:r>
+              <a:rPr lang="ru" sz="1000">
+                <a:solidFill>
+                  <a:srgbClr val="333333"/>
+                </a:solidFill>
+                <a:highlight>
+                  <a:srgbClr val="F7F7F7"/>
+                </a:highlight>
+                <a:latin typeface="Courier New"/>
+                <a:ea typeface="Courier New"/>
+                <a:cs typeface="Courier New"/>
+                <a:sym typeface="Courier New"/>
+              </a:rPr>
+              <a:t>}</a:t>
+            </a:r>
+            <a:endParaRPr>
+              <a:latin typeface="Lato"/>
+              <a:ea typeface="Lato"/>
+              <a:cs typeface="Lato"/>
+              <a:sym typeface="Lato"/>
+            </a:endParaRPr>
+          </a:p>
+        </p:txBody>
+      </p:sp>
+      <p:sp>
+        <p:nvSpPr>
+          <p:cNvPr id="178" name="Google Shape;178;p23"/>
+          <p:cNvSpPr txBox="1"/>
+          <p:nvPr>
+            <p:ph idx="1" type="body"/>
+          </p:nvPr>
+        </p:nvSpPr>
+        <p:spPr>
+          <a:xfrm>
+            <a:off x="729450" y="2057875"/>
+            <a:ext cx="7688700" cy="419400"/>
+          </a:xfrm>
+          <a:prstGeom prst="rect">
+            <a:avLst/>
+          </a:prstGeom>
+        </p:spPr>
+        <p:txBody>
+          <a:bodyPr anchorCtr="0" anchor="t" bIns="91425" lIns="91425" spcFirstLastPara="1" rIns="91425" wrap="square" tIns="91425">
+            <a:noAutofit/>
+          </a:bodyPr>
+          <a:lstStyle/>
+          <a:p>
+            <a:pPr indent="0" lvl="0" marL="0" rtl="0" algn="l">
+              <a:spcBef>
+                <a:spcPts val="0"/>
+              </a:spcBef>
+              <a:spcAft>
+                <a:spcPts val="0"/>
+              </a:spcAft>
+              <a:buNone/>
+            </a:pPr>
+            <a:r>
+              <a:rPr lang="ru"/>
+              <a:t>В gradle также можно делать профили как и в мавен:</a:t>
+            </a:r>
+            <a:endParaRPr/>
+          </a:p>
+          <a:p>
+            <a:pPr indent="0" lvl="0" marL="152400" marR="152400" rtl="0" algn="l">
+              <a:lnSpc>
+                <a:spcPct val="100000"/>
+              </a:lnSpc>
+              <a:spcBef>
+                <a:spcPts val="1600"/>
+              </a:spcBef>
+              <a:spcAft>
+                <a:spcPts val="0"/>
+              </a:spcAft>
+              <a:buNone/>
+            </a:pPr>
+            <a:r>
+              <a:t/>
+            </a:r>
+            <a:endParaRPr sz="1000">
+              <a:solidFill>
+                <a:srgbClr val="333333"/>
+              </a:solidFill>
+              <a:highlight>
+                <a:srgbClr val="F7F7F7"/>
+              </a:highlight>
+              <a:latin typeface="Courier New"/>
+              <a:ea typeface="Courier New"/>
+              <a:cs typeface="Courier New"/>
+              <a:sym typeface="Courier New"/>
+            </a:endParaRPr>
+          </a:p>
+          <a:p>
+            <a:pPr indent="0" lvl="0" marL="0" rtl="0" algn="l">
+              <a:spcBef>
+                <a:spcPts val="1200"/>
+              </a:spcBef>
+              <a:spcAft>
+                <a:spcPts val="0"/>
+              </a:spcAft>
+              <a:buNone/>
+            </a:pPr>
+            <a:r>
+              <a:t/>
+            </a:r>
+            <a:endParaRPr i="1" sz="1000">
+              <a:solidFill>
+                <a:srgbClr val="8C8C8C"/>
+              </a:solidFill>
+              <a:highlight>
+                <a:srgbClr val="FFFFFF"/>
+              </a:highlight>
+              <a:latin typeface="Courier New"/>
+              <a:ea typeface="Courier New"/>
+              <a:cs typeface="Courier New"/>
+              <a:sym typeface="Courier New"/>
+            </a:endParaRPr>
+          </a:p>
+          <a:p>
+            <a:pPr indent="0" lvl="0" marL="0" rtl="0" algn="l">
+              <a:spcBef>
+                <a:spcPts val="1600"/>
+              </a:spcBef>
+              <a:spcAft>
+                <a:spcPts val="1600"/>
+              </a:spcAft>
+              <a:buNone/>
+            </a:pPr>
+            <a:r>
+              <a:t/>
+            </a:r>
+            <a:endParaRPr/>
+          </a:p>
+        </p:txBody>
+      </p:sp>
+    </p:spTree>
+  </p:cSld>
+  <p:clrMapOvr>
+    <a:masterClrMapping/>
+  </p:clrMapOvr>
+</p:sld>
+</file>
+
+<file path=ppt/slides/slide12.xml><?xml version="1.0" encoding="utf-8"?>
+<p:sld xmlns:a="http://schemas.openxmlformats.org/drawingml/2006/main" xmlns:r="http://schemas.openxmlformats.org/officeDocument/2006/relationships" xmlns:mc="http://schemas.openxmlformats.org/markup-compatibility/2006" xmlns:mv="urn:schemas-microsoft-com:mac:vml" xmlns:p="http://schemas.openxmlformats.org/presentationml/2006/main" xmlns:c="http://schemas.openxmlformats.org/drawingml/2006/chart" xmlns:dgm="http://schemas.openxmlformats.org/drawingml/2006/diagram" xmlns:o="urn:schemas-microsoft-com:office:office" xmlns:v="urn:schemas-microsoft-com:vml" xmlns:pvml="urn:schemas-microsoft-com:office:powerpoint" xmlns:com="http://schemas.openxmlformats.org/drawingml/2006/compatibility" xmlns:p14="http://schemas.microsoft.com/office/powerpoint/2010/main" xmlns:p15="http://schemas.microsoft.com/office/powerpoint/2012/main" xmlns:ahyp="http://schemas.microsoft.com/office/drawing/2018/hyperlinkcolor">
+  <p:cSld>
+    <p:spTree>
+      <p:nvGrpSpPr>
+        <p:cNvPr id="182" name="Shape 182"/>
+        <p:cNvGrpSpPr/>
+        <p:nvPr/>
+      </p:nvGrpSpPr>
+      <p:grpSpPr>
+        <a:xfrm>
+          <a:off x="0" y="0"/>
+          <a:ext cx="0" cy="0"/>
+          <a:chOff x="0" y="0"/>
+          <a:chExt cx="0" cy="0"/>
+        </a:xfrm>
+      </p:grpSpPr>
+      <p:sp>
+        <p:nvSpPr>
+          <p:cNvPr id="183" name="Google Shape;183;p24"/>
+          <p:cNvSpPr txBox="1"/>
+          <p:nvPr>
+            <p:ph type="title"/>
+          </p:nvPr>
+        </p:nvSpPr>
+        <p:spPr>
+          <a:xfrm>
+            <a:off x="729450" y="1318650"/>
+            <a:ext cx="7688700" cy="535200"/>
+          </a:xfrm>
+          <a:prstGeom prst="rect">
+            <a:avLst/>
+          </a:prstGeom>
+        </p:spPr>
+        <p:txBody>
+          <a:bodyPr anchorCtr="0" anchor="t" bIns="91425" lIns="91425" spcFirstLastPara="1" rIns="91425" wrap="square" tIns="91425">
+            <a:noAutofit/>
+          </a:bodyPr>
+          <a:lstStyle/>
+          <a:p>
+            <a:pPr indent="0" lvl="0" marL="0" rtl="0" algn="l">
+              <a:spcBef>
+                <a:spcPts val="0"/>
+              </a:spcBef>
+              <a:spcAft>
+                <a:spcPts val="0"/>
+              </a:spcAft>
+              <a:buNone/>
+            </a:pPr>
+            <a:r>
+              <a:rPr lang="ru"/>
+              <a:t>Таски</a:t>
+            </a:r>
+            <a:endParaRPr/>
+          </a:p>
+        </p:txBody>
+      </p:sp>
+      <p:sp>
+        <p:nvSpPr>
+          <p:cNvPr id="184" name="Google Shape;184;p24"/>
+          <p:cNvSpPr txBox="1"/>
+          <p:nvPr>
+            <p:ph idx="1" type="body"/>
+          </p:nvPr>
+        </p:nvSpPr>
+        <p:spPr>
+          <a:xfrm>
+            <a:off x="729450" y="2078875"/>
+            <a:ext cx="7688700" cy="1763100"/>
+          </a:xfrm>
+          <a:prstGeom prst="rect">
+            <a:avLst/>
+          </a:prstGeom>
+          <a:solidFill>
+            <a:srgbClr val="F3F3F3"/>
+          </a:solidFill>
+        </p:spPr>
+        <p:txBody>
+          <a:bodyPr anchorCtr="0" anchor="t" bIns="91425" lIns="91425" spcFirstLastPara="1" rIns="91425" wrap="square" tIns="91425">
+            <a:noAutofit/>
+          </a:bodyPr>
+          <a:lstStyle/>
+          <a:p>
+            <a:pPr indent="0" lvl="0" marL="0" rtl="0" algn="l">
+              <a:lnSpc>
+                <a:spcPct val="100000"/>
+              </a:lnSpc>
+              <a:spcBef>
+                <a:spcPts val="0"/>
+              </a:spcBef>
+              <a:spcAft>
+                <a:spcPts val="0"/>
+              </a:spcAft>
+              <a:buNone/>
+            </a:pPr>
+            <a:r>
+              <a:rPr lang="ru" sz="1200">
+                <a:solidFill>
+                  <a:srgbClr val="333333"/>
+                </a:solidFill>
+                <a:highlight>
+                  <a:srgbClr val="F7F7F7"/>
+                </a:highlight>
+                <a:latin typeface="Courier New"/>
+                <a:ea typeface="Courier New"/>
+                <a:cs typeface="Courier New"/>
+                <a:sym typeface="Courier New"/>
+              </a:rPr>
+              <a:t>task printProjectName {</a:t>
+            </a:r>
+            <a:endParaRPr sz="1200">
+              <a:solidFill>
+                <a:srgbClr val="333333"/>
+              </a:solidFill>
+              <a:highlight>
+                <a:srgbClr val="F7F7F7"/>
+              </a:highlight>
+              <a:latin typeface="Courier New"/>
+              <a:ea typeface="Courier New"/>
+              <a:cs typeface="Courier New"/>
+              <a:sym typeface="Courier New"/>
+            </a:endParaRPr>
+          </a:p>
+          <a:p>
+            <a:pPr indent="0" lvl="0" marL="0" rtl="0" algn="l">
+              <a:lnSpc>
+                <a:spcPct val="100000"/>
+              </a:lnSpc>
+              <a:spcBef>
+                <a:spcPts val="0"/>
+              </a:spcBef>
+              <a:spcAft>
+                <a:spcPts val="0"/>
+              </a:spcAft>
+              <a:buNone/>
+            </a:pPr>
+            <a:r>
+              <a:rPr lang="ru" sz="1200">
+                <a:solidFill>
+                  <a:srgbClr val="333333"/>
+                </a:solidFill>
+                <a:highlight>
+                  <a:srgbClr val="F7F7F7"/>
+                </a:highlight>
+                <a:latin typeface="Courier New"/>
+                <a:ea typeface="Courier New"/>
+                <a:cs typeface="Courier New"/>
+                <a:sym typeface="Courier New"/>
+              </a:rPr>
+              <a:t>    dependsOn build</a:t>
+            </a:r>
+            <a:endParaRPr sz="1200">
+              <a:solidFill>
+                <a:srgbClr val="333333"/>
+              </a:solidFill>
+              <a:highlight>
+                <a:srgbClr val="F7F7F7"/>
+              </a:highlight>
+              <a:latin typeface="Courier New"/>
+              <a:ea typeface="Courier New"/>
+              <a:cs typeface="Courier New"/>
+              <a:sym typeface="Courier New"/>
+            </a:endParaRPr>
+          </a:p>
+          <a:p>
+            <a:pPr indent="0" lvl="0" marL="0" rtl="0" algn="l">
+              <a:lnSpc>
+                <a:spcPct val="100000"/>
+              </a:lnSpc>
+              <a:spcBef>
+                <a:spcPts val="0"/>
+              </a:spcBef>
+              <a:spcAft>
+                <a:spcPts val="0"/>
+              </a:spcAft>
+              <a:buNone/>
+            </a:pPr>
+            <a:r>
+              <a:rPr lang="ru" sz="1200">
+                <a:solidFill>
+                  <a:srgbClr val="333333"/>
+                </a:solidFill>
+                <a:highlight>
+                  <a:srgbClr val="F7F7F7"/>
+                </a:highlight>
+                <a:latin typeface="Courier New"/>
+                <a:ea typeface="Courier New"/>
+                <a:cs typeface="Courier New"/>
+                <a:sym typeface="Courier New"/>
+              </a:rPr>
+              <a:t>    group </a:t>
+            </a:r>
+            <a:r>
+              <a:rPr lang="ru" sz="1200">
+                <a:solidFill>
+                  <a:srgbClr val="008000"/>
+                </a:solidFill>
+                <a:highlight>
+                  <a:srgbClr val="F7F7F7"/>
+                </a:highlight>
+                <a:latin typeface="Courier New"/>
+                <a:ea typeface="Courier New"/>
+                <a:cs typeface="Courier New"/>
+                <a:sym typeface="Courier New"/>
+              </a:rPr>
+              <a:t>'custom tasks'</a:t>
+            </a:r>
+            <a:endParaRPr sz="1200">
+              <a:solidFill>
+                <a:srgbClr val="333333"/>
+              </a:solidFill>
+              <a:highlight>
+                <a:srgbClr val="F7F7F7"/>
+              </a:highlight>
+              <a:latin typeface="Courier New"/>
+              <a:ea typeface="Courier New"/>
+              <a:cs typeface="Courier New"/>
+              <a:sym typeface="Courier New"/>
+            </a:endParaRPr>
+          </a:p>
+          <a:p>
+            <a:pPr indent="0" lvl="0" marL="0" rtl="0" algn="l">
+              <a:lnSpc>
+                <a:spcPct val="100000"/>
+              </a:lnSpc>
+              <a:spcBef>
+                <a:spcPts val="0"/>
+              </a:spcBef>
+              <a:spcAft>
+                <a:spcPts val="0"/>
+              </a:spcAft>
+              <a:buNone/>
+            </a:pPr>
+            <a:r>
+              <a:rPr lang="ru" sz="1200">
+                <a:solidFill>
+                  <a:srgbClr val="333333"/>
+                </a:solidFill>
+                <a:highlight>
+                  <a:srgbClr val="F7F7F7"/>
+                </a:highlight>
+                <a:latin typeface="Courier New"/>
+                <a:ea typeface="Courier New"/>
+                <a:cs typeface="Courier New"/>
+                <a:sym typeface="Courier New"/>
+              </a:rPr>
+              <a:t>    description </a:t>
+            </a:r>
+            <a:r>
+              <a:rPr lang="ru" sz="1200">
+                <a:solidFill>
+                  <a:srgbClr val="008000"/>
+                </a:solidFill>
+                <a:highlight>
+                  <a:srgbClr val="F7F7F7"/>
+                </a:highlight>
+                <a:latin typeface="Courier New"/>
+                <a:ea typeface="Courier New"/>
+                <a:cs typeface="Courier New"/>
+                <a:sym typeface="Courier New"/>
+              </a:rPr>
+              <a:t>'Just print project name'</a:t>
+            </a:r>
+            <a:endParaRPr sz="1200">
+              <a:solidFill>
+                <a:srgbClr val="333333"/>
+              </a:solidFill>
+              <a:highlight>
+                <a:srgbClr val="F7F7F7"/>
+              </a:highlight>
+              <a:latin typeface="Courier New"/>
+              <a:ea typeface="Courier New"/>
+              <a:cs typeface="Courier New"/>
+              <a:sym typeface="Courier New"/>
+            </a:endParaRPr>
+          </a:p>
+          <a:p>
+            <a:pPr indent="0" lvl="0" marL="0" rtl="0" algn="l">
+              <a:lnSpc>
+                <a:spcPct val="100000"/>
+              </a:lnSpc>
+              <a:spcBef>
+                <a:spcPts val="0"/>
+              </a:spcBef>
+              <a:spcAft>
+                <a:spcPts val="0"/>
+              </a:spcAft>
+              <a:buNone/>
+            </a:pPr>
+            <a:r>
+              <a:rPr lang="ru" sz="1200">
+                <a:solidFill>
+                  <a:srgbClr val="333333"/>
+                </a:solidFill>
+                <a:highlight>
+                  <a:srgbClr val="F7F7F7"/>
+                </a:highlight>
+                <a:latin typeface="Courier New"/>
+                <a:ea typeface="Courier New"/>
+                <a:cs typeface="Courier New"/>
+                <a:sym typeface="Courier New"/>
+              </a:rPr>
+              <a:t>    doLast {</a:t>
+            </a:r>
+            <a:endParaRPr sz="1200">
+              <a:solidFill>
+                <a:srgbClr val="333333"/>
+              </a:solidFill>
+              <a:highlight>
+                <a:srgbClr val="F7F7F7"/>
+              </a:highlight>
+              <a:latin typeface="Courier New"/>
+              <a:ea typeface="Courier New"/>
+              <a:cs typeface="Courier New"/>
+              <a:sym typeface="Courier New"/>
+            </a:endParaRPr>
+          </a:p>
+          <a:p>
+            <a:pPr indent="0" lvl="0" marL="0" rtl="0" algn="l">
+              <a:lnSpc>
+                <a:spcPct val="100000"/>
+              </a:lnSpc>
+              <a:spcBef>
+                <a:spcPts val="0"/>
+              </a:spcBef>
+              <a:spcAft>
+                <a:spcPts val="0"/>
+              </a:spcAft>
+              <a:buNone/>
+            </a:pPr>
+            <a:r>
+              <a:rPr lang="ru" sz="1200">
+                <a:solidFill>
+                  <a:srgbClr val="333333"/>
+                </a:solidFill>
+                <a:highlight>
+                  <a:srgbClr val="F7F7F7"/>
+                </a:highlight>
+                <a:latin typeface="Courier New"/>
+                <a:ea typeface="Courier New"/>
+                <a:cs typeface="Courier New"/>
+                <a:sym typeface="Courier New"/>
+              </a:rPr>
+              <a:t>        print </a:t>
+            </a:r>
+            <a:r>
+              <a:rPr lang="ru" sz="1200">
+                <a:solidFill>
+                  <a:srgbClr val="008000"/>
+                </a:solidFill>
+                <a:highlight>
+                  <a:srgbClr val="F7F7F7"/>
+                </a:highlight>
+                <a:latin typeface="Courier New"/>
+                <a:ea typeface="Courier New"/>
+                <a:cs typeface="Courier New"/>
+                <a:sym typeface="Courier New"/>
+              </a:rPr>
+              <a:t>'Project module:'</a:t>
+            </a:r>
+            <a:r>
+              <a:rPr lang="ru" sz="1200">
+                <a:solidFill>
+                  <a:srgbClr val="333333"/>
+                </a:solidFill>
+                <a:highlight>
+                  <a:srgbClr val="F7F7F7"/>
+                </a:highlight>
+                <a:latin typeface="Courier New"/>
+                <a:ea typeface="Courier New"/>
+                <a:cs typeface="Courier New"/>
+                <a:sym typeface="Courier New"/>
+              </a:rPr>
+              <a:t> + archivesBaseName</a:t>
+            </a:r>
+            <a:endParaRPr sz="1200">
+              <a:solidFill>
+                <a:srgbClr val="333333"/>
+              </a:solidFill>
+              <a:highlight>
+                <a:srgbClr val="F7F7F7"/>
+              </a:highlight>
+              <a:latin typeface="Courier New"/>
+              <a:ea typeface="Courier New"/>
+              <a:cs typeface="Courier New"/>
+              <a:sym typeface="Courier New"/>
+            </a:endParaRPr>
+          </a:p>
+          <a:p>
+            <a:pPr indent="0" lvl="0" marL="0" rtl="0" algn="l">
+              <a:lnSpc>
+                <a:spcPct val="100000"/>
+              </a:lnSpc>
+              <a:spcBef>
+                <a:spcPts val="0"/>
+              </a:spcBef>
+              <a:spcAft>
+                <a:spcPts val="0"/>
+              </a:spcAft>
+              <a:buNone/>
+            </a:pPr>
+            <a:r>
+              <a:rPr lang="ru" sz="1200">
+                <a:solidFill>
+                  <a:srgbClr val="333333"/>
+                </a:solidFill>
+                <a:highlight>
+                  <a:srgbClr val="F7F7F7"/>
+                </a:highlight>
+                <a:latin typeface="Courier New"/>
+                <a:ea typeface="Courier New"/>
+                <a:cs typeface="Courier New"/>
+                <a:sym typeface="Courier New"/>
+              </a:rPr>
+              <a:t>    }</a:t>
+            </a:r>
+            <a:endParaRPr sz="1200">
+              <a:solidFill>
+                <a:srgbClr val="333333"/>
+              </a:solidFill>
+              <a:highlight>
+                <a:srgbClr val="F7F7F7"/>
+              </a:highlight>
+              <a:latin typeface="Courier New"/>
+              <a:ea typeface="Courier New"/>
+              <a:cs typeface="Courier New"/>
+              <a:sym typeface="Courier New"/>
+            </a:endParaRPr>
+          </a:p>
+          <a:p>
+            <a:pPr indent="0" lvl="0" marL="0" marR="152400" rtl="0" algn="l">
+              <a:lnSpc>
+                <a:spcPct val="100000"/>
+              </a:lnSpc>
+              <a:spcBef>
+                <a:spcPts val="0"/>
+              </a:spcBef>
+              <a:spcAft>
+                <a:spcPts val="0"/>
+              </a:spcAft>
+              <a:buNone/>
+            </a:pPr>
+            <a:r>
+              <a:rPr lang="ru" sz="1200">
+                <a:solidFill>
+                  <a:srgbClr val="333333"/>
+                </a:solidFill>
+                <a:highlight>
+                  <a:srgbClr val="F7F7F7"/>
+                </a:highlight>
+                <a:latin typeface="Courier New"/>
+                <a:ea typeface="Courier New"/>
+                <a:cs typeface="Courier New"/>
+                <a:sym typeface="Courier New"/>
+              </a:rPr>
+              <a:t>}</a:t>
+            </a:r>
+            <a:endParaRPr sz="1200">
+              <a:solidFill>
+                <a:srgbClr val="333333"/>
+              </a:solidFill>
+              <a:highlight>
+                <a:srgbClr val="F7F7F7"/>
+              </a:highlight>
+              <a:latin typeface="Courier New"/>
+              <a:ea typeface="Courier New"/>
+              <a:cs typeface="Courier New"/>
+              <a:sym typeface="Courier New"/>
+            </a:endParaRPr>
+          </a:p>
+          <a:p>
+            <a:pPr indent="0" lvl="0" marL="0" rtl="0" algn="l">
+              <a:spcBef>
+                <a:spcPts val="0"/>
               </a:spcBef>
               <a:spcAft>
                 <a:spcPts val="1600"/>
@@ -12923,7 +14348,7 @@
             <a:tbl>
               <a:tblPr>
                 <a:noFill/>
-                <a:tableStyleId>{6210A56C-6103-4B0E-848B-AE9B50DA12A6}</a:tableStyleId>
+                <a:tableStyleId>{C581B2C0-2CA6-47D1-A9CB-A2E818ACE926}</a:tableStyleId>
               </a:tblPr>
               <a:tblGrid>
                 <a:gridCol w="1238250"/>

</xml_diff>